<commit_message>
Edited Sprint 5 presentation
Changed some slides
</commit_message>
<xml_diff>
--- a/Documentation/4999 - Sprint5.pptx
+++ b/Documentation/4999 - Sprint5.pptx
@@ -5,7 +5,7 @@
     <p:sldMasterId id="2147483659" r:id="rId1"/>
   </p:sldMasterIdLst>
   <p:notesMasterIdLst>
-    <p:notesMasterId r:id="rId15"/>
+    <p:notesMasterId r:id="rId11"/>
   </p:notesMasterIdLst>
   <p:sldIdLst>
     <p:sldId id="256" r:id="rId2"/>
@@ -16,26 +16,22 @@
     <p:sldId id="278" r:id="rId7"/>
     <p:sldId id="279" r:id="rId8"/>
     <p:sldId id="280" r:id="rId9"/>
-    <p:sldId id="281" r:id="rId10"/>
-    <p:sldId id="282" r:id="rId11"/>
-    <p:sldId id="283" r:id="rId12"/>
-    <p:sldId id="284" r:id="rId13"/>
-    <p:sldId id="264" r:id="rId14"/>
+    <p:sldId id="264" r:id="rId10"/>
   </p:sldIdLst>
   <p:sldSz cx="9144000" cy="5143500" type="screen16x9"/>
   <p:notesSz cx="6858000" cy="9144000"/>
   <p:embeddedFontLst>
     <p:embeddedFont>
       <p:font typeface="Montserrat" panose="020B0604020202020204" charset="0"/>
-      <p:regular r:id="rId16"/>
-      <p:bold r:id="rId17"/>
+      <p:regular r:id="rId12"/>
+      <p:bold r:id="rId13"/>
     </p:embeddedFont>
     <p:embeddedFont>
       <p:font typeface="Lato" panose="020B0604020202020204" charset="0"/>
-      <p:regular r:id="rId18"/>
-      <p:bold r:id="rId19"/>
-      <p:italic r:id="rId20"/>
-      <p:boldItalic r:id="rId21"/>
+      <p:regular r:id="rId14"/>
+      <p:bold r:id="rId15"/>
+      <p:italic r:id="rId16"/>
+      <p:boldItalic r:id="rId17"/>
     </p:embeddedFont>
   </p:embeddedFontLst>
   <p:defaultTextStyle>
@@ -6282,441 +6278,6 @@
 </p:sld>
 </file>
 
-<file path=ppt/slides/slide10.xml><?xml version="1.0" encoding="utf-8"?>
-<p:sld xmlns:a="http://schemas.openxmlformats.org/drawingml/2006/main" xmlns:r="http://schemas.openxmlformats.org/officeDocument/2006/relationships" xmlns:p="http://schemas.openxmlformats.org/presentationml/2006/main">
-  <p:cSld>
-    <p:spTree>
-      <p:nvGrpSpPr>
-        <p:cNvPr id="1" name=""/>
-        <p:cNvGrpSpPr/>
-        <p:nvPr/>
-      </p:nvGrpSpPr>
-      <p:grpSpPr>
-        <a:xfrm>
-          <a:off x="0" y="0"/>
-          <a:ext cx="0" cy="0"/>
-          <a:chOff x="0" y="0"/>
-          <a:chExt cx="0" cy="0"/>
-        </a:xfrm>
-      </p:grpSpPr>
-      <p:sp>
-        <p:nvSpPr>
-          <p:cNvPr id="2" name="Title 1">
-            <a:extLst>
-              <a:ext uri="{FF2B5EF4-FFF2-40B4-BE49-F238E27FC236}">
-                <a16:creationId xmlns:a16="http://schemas.microsoft.com/office/drawing/2014/main" id="{92E2C988-C286-4162-821F-B22539435A0D}"/>
-              </a:ext>
-            </a:extLst>
-          </p:cNvPr>
-          <p:cNvSpPr>
-            <a:spLocks noGrp="1"/>
-          </p:cNvSpPr>
-          <p:nvPr>
-            <p:ph type="title"/>
-          </p:nvPr>
-        </p:nvSpPr>
-        <p:spPr/>
-        <p:txBody>
-          <a:bodyPr/>
-          <a:lstStyle/>
-          <a:p>
-            <a:r>
-              <a:rPr lang="en-US" dirty="0"/>
-              <a:t>UC-</a:t>
-            </a:r>
-            <a:r>
-              <a:rPr lang="en-US" dirty="0" err="1"/>
-              <a:t>GenerateAccountInfo</a:t>
-            </a:r>
-            <a:r>
-              <a:rPr lang="en-US" dirty="0"/>
-              <a:t> Continued</a:t>
-            </a:r>
-          </a:p>
-        </p:txBody>
-      </p:sp>
-      <p:sp>
-        <p:nvSpPr>
-          <p:cNvPr id="3" name="Text Placeholder 2">
-            <a:extLst>
-              <a:ext uri="{FF2B5EF4-FFF2-40B4-BE49-F238E27FC236}">
-                <a16:creationId xmlns:a16="http://schemas.microsoft.com/office/drawing/2014/main" id="{3688B78C-3DEA-4BE8-AE05-A5C5348B9112}"/>
-              </a:ext>
-            </a:extLst>
-          </p:cNvPr>
-          <p:cNvSpPr>
-            <a:spLocks noGrp="1"/>
-          </p:cNvSpPr>
-          <p:nvPr>
-            <p:ph type="body" idx="1"/>
-          </p:nvPr>
-        </p:nvSpPr>
-        <p:spPr/>
-        <p:txBody>
-          <a:bodyPr/>
-          <a:lstStyle/>
-          <a:p>
-            <a:r>
-              <a:rPr lang="en-US" dirty="0"/>
-              <a:t>Activity Diagram</a:t>
-            </a:r>
-          </a:p>
-        </p:txBody>
-      </p:sp>
-      <p:pic>
-        <p:nvPicPr>
-          <p:cNvPr id="4" name="Picture 3">
-            <a:extLst>
-              <a:ext uri="{FF2B5EF4-FFF2-40B4-BE49-F238E27FC236}">
-                <a16:creationId xmlns:a16="http://schemas.microsoft.com/office/drawing/2014/main" id="{C6FB99A6-A7D9-47BA-BBCE-29B840DAAB77}"/>
-              </a:ext>
-            </a:extLst>
-          </p:cNvPr>
-          <p:cNvPicPr>
-            <a:picLocks noChangeAspect="1"/>
-          </p:cNvPicPr>
-          <p:nvPr/>
-        </p:nvPicPr>
-        <p:blipFill>
-          <a:blip r:embed="rId2"/>
-          <a:stretch>
-            <a:fillRect/>
-          </a:stretch>
-        </p:blipFill>
-        <p:spPr>
-          <a:xfrm>
-            <a:off x="3662751" y="1032787"/>
-            <a:ext cx="4925971" cy="3835650"/>
-          </a:xfrm>
-          <a:prstGeom prst="rect">
-            <a:avLst/>
-          </a:prstGeom>
-        </p:spPr>
-      </p:pic>
-    </p:spTree>
-    <p:extLst>
-      <p:ext uri="{BB962C8B-B14F-4D97-AF65-F5344CB8AC3E}">
-        <p14:creationId xmlns:p14="http://schemas.microsoft.com/office/powerpoint/2010/main" val="1759748371"/>
-      </p:ext>
-    </p:extLst>
-  </p:cSld>
-  <p:clrMapOvr>
-    <a:masterClrMapping/>
-  </p:clrMapOvr>
-</p:sld>
-</file>
-
-<file path=ppt/slides/slide11.xml><?xml version="1.0" encoding="utf-8"?>
-<p:sld xmlns:a="http://schemas.openxmlformats.org/drawingml/2006/main" xmlns:r="http://schemas.openxmlformats.org/officeDocument/2006/relationships" xmlns:p="http://schemas.openxmlformats.org/presentationml/2006/main">
-  <p:cSld>
-    <p:spTree>
-      <p:nvGrpSpPr>
-        <p:cNvPr id="1" name=""/>
-        <p:cNvGrpSpPr/>
-        <p:nvPr/>
-      </p:nvGrpSpPr>
-      <p:grpSpPr>
-        <a:xfrm>
-          <a:off x="0" y="0"/>
-          <a:ext cx="0" cy="0"/>
-          <a:chOff x="0" y="0"/>
-          <a:chExt cx="0" cy="0"/>
-        </a:xfrm>
-      </p:grpSpPr>
-      <p:sp>
-        <p:nvSpPr>
-          <p:cNvPr id="2" name="Title 1">
-            <a:extLst>
-              <a:ext uri="{FF2B5EF4-FFF2-40B4-BE49-F238E27FC236}">
-                <a16:creationId xmlns:a16="http://schemas.microsoft.com/office/drawing/2014/main" id="{00147F53-AFC7-4B97-9D1A-F9FA62E252E9}"/>
-              </a:ext>
-            </a:extLst>
-          </p:cNvPr>
-          <p:cNvSpPr>
-            <a:spLocks noGrp="1"/>
-          </p:cNvSpPr>
-          <p:nvPr>
-            <p:ph type="title"/>
-          </p:nvPr>
-        </p:nvSpPr>
-        <p:spPr/>
-        <p:txBody>
-          <a:bodyPr/>
-          <a:lstStyle/>
-          <a:p>
-            <a:r>
-              <a:rPr lang="en-US" dirty="0"/>
-              <a:t>UC-</a:t>
-            </a:r>
-            <a:r>
-              <a:rPr lang="en-US" dirty="0" err="1"/>
-              <a:t>GenerateAccountInfo</a:t>
-            </a:r>
-            <a:r>
-              <a:rPr lang="en-US" dirty="0"/>
-              <a:t> Continued</a:t>
-            </a:r>
-          </a:p>
-        </p:txBody>
-      </p:sp>
-      <p:sp>
-        <p:nvSpPr>
-          <p:cNvPr id="3" name="Text Placeholder 2">
-            <a:extLst>
-              <a:ext uri="{FF2B5EF4-FFF2-40B4-BE49-F238E27FC236}">
-                <a16:creationId xmlns:a16="http://schemas.microsoft.com/office/drawing/2014/main" id="{47F9231C-03C6-480C-AB9D-AD3D9AE060DC}"/>
-              </a:ext>
-            </a:extLst>
-          </p:cNvPr>
-          <p:cNvSpPr>
-            <a:spLocks noGrp="1"/>
-          </p:cNvSpPr>
-          <p:nvPr>
-            <p:ph type="body" idx="1"/>
-          </p:nvPr>
-        </p:nvSpPr>
-        <p:spPr/>
-        <p:txBody>
-          <a:bodyPr/>
-          <a:lstStyle/>
-          <a:p>
-            <a:r>
-              <a:rPr lang="en-US" dirty="0"/>
-              <a:t> Activity Diagram </a:t>
-            </a:r>
-          </a:p>
-        </p:txBody>
-      </p:sp>
-      <p:pic>
-        <p:nvPicPr>
-          <p:cNvPr id="4" name="Picture 3">
-            <a:extLst>
-              <a:ext uri="{FF2B5EF4-FFF2-40B4-BE49-F238E27FC236}">
-                <a16:creationId xmlns:a16="http://schemas.microsoft.com/office/drawing/2014/main" id="{76B5C5DA-39F8-413A-95B6-CC4ED30321EB}"/>
-              </a:ext>
-            </a:extLst>
-          </p:cNvPr>
-          <p:cNvPicPr>
-            <a:picLocks noChangeAspect="1"/>
-          </p:cNvPicPr>
-          <p:nvPr/>
-        </p:nvPicPr>
-        <p:blipFill>
-          <a:blip r:embed="rId2"/>
-          <a:stretch>
-            <a:fillRect/>
-          </a:stretch>
-        </p:blipFill>
-        <p:spPr>
-          <a:xfrm>
-            <a:off x="4268557" y="1136975"/>
-            <a:ext cx="3770477" cy="3772350"/>
-          </a:xfrm>
-          <a:prstGeom prst="rect">
-            <a:avLst/>
-          </a:prstGeom>
-        </p:spPr>
-      </p:pic>
-    </p:spTree>
-    <p:extLst>
-      <p:ext uri="{BB962C8B-B14F-4D97-AF65-F5344CB8AC3E}">
-        <p14:creationId xmlns:p14="http://schemas.microsoft.com/office/powerpoint/2010/main" val="3411452106"/>
-      </p:ext>
-    </p:extLst>
-  </p:cSld>
-  <p:clrMapOvr>
-    <a:masterClrMapping/>
-  </p:clrMapOvr>
-</p:sld>
-</file>
-
-<file path=ppt/slides/slide12.xml><?xml version="1.0" encoding="utf-8"?>
-<p:sld xmlns:a="http://schemas.openxmlformats.org/drawingml/2006/main" xmlns:r="http://schemas.openxmlformats.org/officeDocument/2006/relationships" xmlns:p="http://schemas.openxmlformats.org/presentationml/2006/main">
-  <p:cSld>
-    <p:spTree>
-      <p:nvGrpSpPr>
-        <p:cNvPr id="1" name=""/>
-        <p:cNvGrpSpPr/>
-        <p:nvPr/>
-      </p:nvGrpSpPr>
-      <p:grpSpPr>
-        <a:xfrm>
-          <a:off x="0" y="0"/>
-          <a:ext cx="0" cy="0"/>
-          <a:chOff x="0" y="0"/>
-          <a:chExt cx="0" cy="0"/>
-        </a:xfrm>
-      </p:grpSpPr>
-      <p:sp>
-        <p:nvSpPr>
-          <p:cNvPr id="2" name="Title 1">
-            <a:extLst>
-              <a:ext uri="{FF2B5EF4-FFF2-40B4-BE49-F238E27FC236}">
-                <a16:creationId xmlns:a16="http://schemas.microsoft.com/office/drawing/2014/main" id="{30E01517-89D5-479E-AB92-F077C68F7D1D}"/>
-              </a:ext>
-            </a:extLst>
-          </p:cNvPr>
-          <p:cNvSpPr>
-            <a:spLocks noGrp="1"/>
-          </p:cNvSpPr>
-          <p:nvPr>
-            <p:ph type="title"/>
-          </p:nvPr>
-        </p:nvSpPr>
-        <p:spPr/>
-        <p:txBody>
-          <a:bodyPr/>
-          <a:lstStyle/>
-          <a:p>
-            <a:r>
-              <a:rPr lang="en-US" dirty="0"/>
-              <a:t>UC-</a:t>
-            </a:r>
-            <a:r>
-              <a:rPr lang="en-US" dirty="0" err="1"/>
-              <a:t>GenerateAccountInfo</a:t>
-            </a:r>
-            <a:r>
-              <a:rPr lang="en-US" dirty="0"/>
-              <a:t> Continued</a:t>
-            </a:r>
-          </a:p>
-        </p:txBody>
-      </p:sp>
-      <p:sp>
-        <p:nvSpPr>
-          <p:cNvPr id="3" name="Text Placeholder 2">
-            <a:extLst>
-              <a:ext uri="{FF2B5EF4-FFF2-40B4-BE49-F238E27FC236}">
-                <a16:creationId xmlns:a16="http://schemas.microsoft.com/office/drawing/2014/main" id="{49A6E065-6F1B-49E2-946B-11841438A845}"/>
-              </a:ext>
-            </a:extLst>
-          </p:cNvPr>
-          <p:cNvSpPr>
-            <a:spLocks noGrp="1"/>
-          </p:cNvSpPr>
-          <p:nvPr>
-            <p:ph type="body" idx="1"/>
-          </p:nvPr>
-        </p:nvSpPr>
-        <p:spPr/>
-        <p:txBody>
-          <a:bodyPr/>
-          <a:lstStyle/>
-          <a:p>
-            <a:r>
-              <a:rPr lang="en-US" dirty="0"/>
-              <a:t>Sequence Diagram </a:t>
-            </a:r>
-          </a:p>
-        </p:txBody>
-      </p:sp>
-      <p:pic>
-        <p:nvPicPr>
-          <p:cNvPr id="4" name="Picture 3">
-            <a:extLst>
-              <a:ext uri="{FF2B5EF4-FFF2-40B4-BE49-F238E27FC236}">
-                <a16:creationId xmlns:a16="http://schemas.microsoft.com/office/drawing/2014/main" id="{F56F815B-8383-4FE7-BF8E-F4006244B977}"/>
-              </a:ext>
-            </a:extLst>
-          </p:cNvPr>
-          <p:cNvPicPr>
-            <a:picLocks noChangeAspect="1"/>
-          </p:cNvPicPr>
-          <p:nvPr/>
-        </p:nvPicPr>
-        <p:blipFill>
-          <a:blip r:embed="rId2"/>
-          <a:stretch>
-            <a:fillRect/>
-          </a:stretch>
-        </p:blipFill>
-        <p:spPr>
-          <a:xfrm>
-            <a:off x="3073722" y="1046131"/>
-            <a:ext cx="5672848" cy="3954037"/>
-          </a:xfrm>
-          <a:prstGeom prst="rect">
-            <a:avLst/>
-          </a:prstGeom>
-        </p:spPr>
-      </p:pic>
-    </p:spTree>
-    <p:extLst>
-      <p:ext uri="{BB962C8B-B14F-4D97-AF65-F5344CB8AC3E}">
-        <p14:creationId xmlns:p14="http://schemas.microsoft.com/office/powerpoint/2010/main" val="2461925098"/>
-      </p:ext>
-    </p:extLst>
-  </p:cSld>
-  <p:clrMapOvr>
-    <a:masterClrMapping/>
-  </p:clrMapOvr>
-</p:sld>
-</file>
-
-<file path=ppt/slides/slide13.xml><?xml version="1.0" encoding="utf-8"?>
-<p:sld xmlns:a="http://schemas.openxmlformats.org/drawingml/2006/main" xmlns:r="http://schemas.openxmlformats.org/officeDocument/2006/relationships" xmlns:p="http://schemas.openxmlformats.org/presentationml/2006/main">
-  <p:cSld>
-    <p:spTree>
-      <p:nvGrpSpPr>
-        <p:cNvPr id="1" name="Shape 181"/>
-        <p:cNvGrpSpPr/>
-        <p:nvPr/>
-      </p:nvGrpSpPr>
-      <p:grpSpPr>
-        <a:xfrm>
-          <a:off x="0" y="0"/>
-          <a:ext cx="0" cy="0"/>
-          <a:chOff x="0" y="0"/>
-          <a:chExt cx="0" cy="0"/>
-        </a:xfrm>
-      </p:grpSpPr>
-      <p:sp>
-        <p:nvSpPr>
-          <p:cNvPr id="182" name="Shape 182"/>
-          <p:cNvSpPr txBox="1">
-            <a:spLocks noGrp="1"/>
-          </p:cNvSpPr>
-          <p:nvPr>
-            <p:ph type="title"/>
-          </p:nvPr>
-        </p:nvSpPr>
-        <p:spPr>
-          <a:xfrm>
-            <a:off x="2969700" y="1777950"/>
-            <a:ext cx="3204600" cy="1587600"/>
-          </a:xfrm>
-          <a:prstGeom prst="rect">
-            <a:avLst/>
-          </a:prstGeom>
-        </p:spPr>
-        <p:txBody>
-          <a:bodyPr wrap="square" lIns="91425" tIns="91425" rIns="91425" bIns="91425" anchor="ctr" anchorCtr="0">
-            <a:noAutofit/>
-          </a:bodyPr>
-          <a:lstStyle/>
-          <a:p>
-            <a:pPr lvl="0" algn="ctr">
-              <a:spcBef>
-                <a:spcPts val="0"/>
-              </a:spcBef>
-              <a:buNone/>
-            </a:pPr>
-            <a:r>
-              <a:rPr lang="en" sz="4800"/>
-              <a:t>END</a:t>
-            </a:r>
-          </a:p>
-        </p:txBody>
-      </p:sp>
-    </p:spTree>
-  </p:cSld>
-  <p:clrMapOvr>
-    <a:masterClrMapping/>
-  </p:clrMapOvr>
-</p:sld>
-</file>
-
 <file path=ppt/slides/slide2.xml><?xml version="1.0" encoding="utf-8"?>
 <p:sld xmlns:a="http://schemas.openxmlformats.org/drawingml/2006/main" xmlns:r="http://schemas.openxmlformats.org/officeDocument/2006/relationships" xmlns:p="http://schemas.openxmlformats.org/presentationml/2006/main">
   <p:cSld>
@@ -7005,6 +6566,10 @@
             <a:r>
               <a:rPr lang="en-US" b="1" dirty="0"/>
               <a:t>Use Case-17 A manager can make the employee’s schedule</a:t>
+            </a:r>
+            <a:r>
+              <a:rPr lang="en-US" dirty="0"/>
+              <a:t/>
             </a:r>
             <a:br>
               <a:rPr lang="en-US" dirty="0"/>
@@ -7380,6 +6945,10 @@
               </a:spcAft>
               <a:buNone/>
             </a:pPr>
+            <a:r>
+              <a:rPr lang="en-US" sz="1400" dirty="0"/>
+              <a:t/>
+            </a:r>
             <a:br>
               <a:rPr lang="en-US" sz="1400" dirty="0"/>
             </a:br>
@@ -7484,6 +7053,10 @@
             <a:r>
               <a:rPr lang="en-US" b="1" dirty="0"/>
               <a:t> An employee can view their schedule</a:t>
+            </a:r>
+            <a:r>
+              <a:rPr lang="en-US" dirty="0"/>
+              <a:t/>
             </a:r>
             <a:br>
               <a:rPr lang="en-US" dirty="0"/>
@@ -7786,7 +7359,7 @@
   <p:cSld>
     <p:spTree>
       <p:nvGrpSpPr>
-        <p:cNvPr id="1" name=""/>
+        <p:cNvPr id="1" name="Shape 181"/>
         <p:cNvGrpSpPr/>
         <p:nvPr/>
       </p:nvGrpSpPr>
@@ -7800,106 +7373,43 @@
       </p:grpSpPr>
       <p:sp>
         <p:nvSpPr>
-          <p:cNvPr id="2" name="Title 1">
-            <a:extLst>
-              <a:ext uri="{FF2B5EF4-FFF2-40B4-BE49-F238E27FC236}">
-                <a16:creationId xmlns:a16="http://schemas.microsoft.com/office/drawing/2014/main" id="{AC9A987D-98CF-443A-871D-9A7172414B74}"/>
-              </a:ext>
-            </a:extLst>
-          </p:cNvPr>
-          <p:cNvSpPr>
+          <p:cNvPr id="182" name="Shape 182"/>
+          <p:cNvSpPr txBox="1">
             <a:spLocks noGrp="1"/>
           </p:cNvSpPr>
           <p:nvPr>
             <p:ph type="title"/>
           </p:nvPr>
         </p:nvSpPr>
-        <p:spPr/>
-        <p:txBody>
-          <a:bodyPr/>
-          <a:lstStyle/>
-          <a:p>
-            <a:r>
-              <a:rPr lang="en-US" dirty="0"/>
-              <a:t>UC-</a:t>
-            </a:r>
-            <a:r>
-              <a:rPr lang="en-US" dirty="0" err="1"/>
-              <a:t>GenerateAccountInfo</a:t>
-            </a:r>
-            <a:endParaRPr lang="en-US" dirty="0"/>
-          </a:p>
-        </p:txBody>
-      </p:sp>
-      <p:pic>
-        <p:nvPicPr>
-          <p:cNvPr id="5" name="Picture 4">
-            <a:extLst>
-              <a:ext uri="{FF2B5EF4-FFF2-40B4-BE49-F238E27FC236}">
-                <a16:creationId xmlns:a16="http://schemas.microsoft.com/office/drawing/2014/main" id="{545DD9A0-F349-4601-859D-C271BA193ADD}"/>
-              </a:ext>
-            </a:extLst>
-          </p:cNvPr>
-          <p:cNvPicPr>
-            <a:picLocks noChangeAspect="1"/>
-          </p:cNvPicPr>
-          <p:nvPr/>
-        </p:nvPicPr>
-        <p:blipFill>
-          <a:blip r:embed="rId2"/>
-          <a:stretch>
-            <a:fillRect/>
-          </a:stretch>
-        </p:blipFill>
         <p:spPr>
           <a:xfrm>
-            <a:off x="3717073" y="1372639"/>
-            <a:ext cx="4975079" cy="3033391"/>
+            <a:off x="2969700" y="1777950"/>
+            <a:ext cx="3204600" cy="1587600"/>
           </a:xfrm>
           <a:prstGeom prst="rect">
             <a:avLst/>
           </a:prstGeom>
         </p:spPr>
-      </p:pic>
-      <p:sp>
-        <p:nvSpPr>
-          <p:cNvPr id="3" name="Text Placeholder 2">
-            <a:extLst>
-              <a:ext uri="{FF2B5EF4-FFF2-40B4-BE49-F238E27FC236}">
-                <a16:creationId xmlns:a16="http://schemas.microsoft.com/office/drawing/2014/main" id="{7A8B1CF9-C7DB-439C-8D82-E537EF03F437}"/>
-              </a:ext>
-            </a:extLst>
-          </p:cNvPr>
-          <p:cNvSpPr>
-            <a:spLocks noGrp="1"/>
-          </p:cNvSpPr>
-          <p:nvPr>
-            <p:ph type="body" idx="1"/>
-          </p:nvPr>
-        </p:nvSpPr>
-        <p:spPr/>
         <p:txBody>
-          <a:bodyPr/>
+          <a:bodyPr wrap="square" lIns="91425" tIns="91425" rIns="91425" bIns="91425" anchor="ctr" anchorCtr="0">
+            <a:noAutofit/>
+          </a:bodyPr>
           <a:lstStyle/>
           <a:p>
-            <a:pPr marL="285750" indent="-285750"/>
+            <a:pPr lvl="0" algn="ctr">
+              <a:spcBef>
+                <a:spcPts val="0"/>
+              </a:spcBef>
+              <a:buNone/>
+            </a:pPr>
             <a:r>
-              <a:rPr lang="en-US" dirty="0" err="1"/>
-              <a:t>Usecase</a:t>
-            </a:r>
-            <a:r>
-              <a:rPr lang="en-US" dirty="0"/>
-              <a:t> Diagram</a:t>
+              <a:rPr lang="en" sz="4800"/>
+              <a:t>END</a:t>
             </a:r>
           </a:p>
         </p:txBody>
       </p:sp>
     </p:spTree>
-    <p:extLst>
-      <p:ext uri="{BB962C8B-B14F-4D97-AF65-F5344CB8AC3E}">
-        <p14:creationId xmlns:p14="http://schemas.microsoft.com/office/powerpoint/2010/main" val="3371760981"/>
-      </p:ext>
-    </p:extLst>
   </p:cSld>
   <p:clrMapOvr>
     <a:masterClrMapping/>

</xml_diff>